<commit_message>
Polishing Chapter 2 10.000ft
</commit_message>
<xml_diff>
--- a/02_softwareEngnieering10000ft/softwareEngineering10000ft_slides.pptx
+++ b/02_softwareEngnieering10000ft/softwareEngineering10000ft_slides.pptx
@@ -257,7 +257,7 @@
           <a:p>
             <a:fld id="{311397B5-8C69-41E8-80AB-B2B64B3912C3}" type="datetimeFigureOut">
               <a:rPr lang="de-DE" smtClean="0"/>
-              <a:t>16.01.2018</a:t>
+              <a:t>17.01.2018</a:t>
             </a:fld>
             <a:endParaRPr lang="de-DE"/>
           </a:p>
@@ -427,7 +427,7 @@
           <a:p>
             <a:fld id="{311397B5-8C69-41E8-80AB-B2B64B3912C3}" type="datetimeFigureOut">
               <a:rPr lang="de-DE" smtClean="0"/>
-              <a:t>16.01.2018</a:t>
+              <a:t>17.01.2018</a:t>
             </a:fld>
             <a:endParaRPr lang="de-DE"/>
           </a:p>
@@ -607,7 +607,7 @@
           <a:p>
             <a:fld id="{311397B5-8C69-41E8-80AB-B2B64B3912C3}" type="datetimeFigureOut">
               <a:rPr lang="de-DE" smtClean="0"/>
-              <a:t>16.01.2018</a:t>
+              <a:t>17.01.2018</a:t>
             </a:fld>
             <a:endParaRPr lang="de-DE"/>
           </a:p>
@@ -777,7 +777,7 @@
           <a:p>
             <a:fld id="{311397B5-8C69-41E8-80AB-B2B64B3912C3}" type="datetimeFigureOut">
               <a:rPr lang="de-DE" smtClean="0"/>
-              <a:t>16.01.2018</a:t>
+              <a:t>17.01.2018</a:t>
             </a:fld>
             <a:endParaRPr lang="de-DE"/>
           </a:p>
@@ -1023,7 +1023,7 @@
           <a:p>
             <a:fld id="{311397B5-8C69-41E8-80AB-B2B64B3912C3}" type="datetimeFigureOut">
               <a:rPr lang="de-DE" smtClean="0"/>
-              <a:t>16.01.2018</a:t>
+              <a:t>17.01.2018</a:t>
             </a:fld>
             <a:endParaRPr lang="de-DE"/>
           </a:p>
@@ -1255,7 +1255,7 @@
           <a:p>
             <a:fld id="{311397B5-8C69-41E8-80AB-B2B64B3912C3}" type="datetimeFigureOut">
               <a:rPr lang="de-DE" smtClean="0"/>
-              <a:t>16.01.2018</a:t>
+              <a:t>17.01.2018</a:t>
             </a:fld>
             <a:endParaRPr lang="de-DE"/>
           </a:p>
@@ -1622,7 +1622,7 @@
           <a:p>
             <a:fld id="{311397B5-8C69-41E8-80AB-B2B64B3912C3}" type="datetimeFigureOut">
               <a:rPr lang="de-DE" smtClean="0"/>
-              <a:t>16.01.2018</a:t>
+              <a:t>17.01.2018</a:t>
             </a:fld>
             <a:endParaRPr lang="de-DE"/>
           </a:p>
@@ -1740,7 +1740,7 @@
           <a:p>
             <a:fld id="{311397B5-8C69-41E8-80AB-B2B64B3912C3}" type="datetimeFigureOut">
               <a:rPr lang="de-DE" smtClean="0"/>
-              <a:t>16.01.2018</a:t>
+              <a:t>17.01.2018</a:t>
             </a:fld>
             <a:endParaRPr lang="de-DE"/>
           </a:p>
@@ -1835,7 +1835,7 @@
           <a:p>
             <a:fld id="{311397B5-8C69-41E8-80AB-B2B64B3912C3}" type="datetimeFigureOut">
               <a:rPr lang="de-DE" smtClean="0"/>
-              <a:t>16.01.2018</a:t>
+              <a:t>17.01.2018</a:t>
             </a:fld>
             <a:endParaRPr lang="de-DE"/>
           </a:p>
@@ -2112,7 +2112,7 @@
           <a:p>
             <a:fld id="{311397B5-8C69-41E8-80AB-B2B64B3912C3}" type="datetimeFigureOut">
               <a:rPr lang="de-DE" smtClean="0"/>
-              <a:t>16.01.2018</a:t>
+              <a:t>17.01.2018</a:t>
             </a:fld>
             <a:endParaRPr lang="de-DE"/>
           </a:p>
@@ -2365,7 +2365,7 @@
           <a:p>
             <a:fld id="{311397B5-8C69-41E8-80AB-B2B64B3912C3}" type="datetimeFigureOut">
               <a:rPr lang="de-DE" smtClean="0"/>
-              <a:t>16.01.2018</a:t>
+              <a:t>17.01.2018</a:t>
             </a:fld>
             <a:endParaRPr lang="de-DE"/>
           </a:p>
@@ -2578,7 +2578,7 @@
           <a:p>
             <a:fld id="{311397B5-8C69-41E8-80AB-B2B64B3912C3}" type="datetimeFigureOut">
               <a:rPr lang="de-DE" smtClean="0"/>
-              <a:t>16.01.2018</a:t>
+              <a:t>17.01.2018</a:t>
             </a:fld>
             <a:endParaRPr lang="de-DE"/>
           </a:p>
@@ -3012,15 +3012,7 @@
                   <a:srgbClr val="C00000"/>
                 </a:solidFill>
               </a:rPr>
-              <a:t>Chapter </a:t>
-            </a:r>
-            <a:r>
-              <a:rPr lang="de-DE" sz="6000" b="1" dirty="0" smtClean="0">
-                <a:solidFill>
-                  <a:srgbClr val="C00000"/>
-                </a:solidFill>
-              </a:rPr>
-              <a:t>2: </a:t>
+              <a:t>Chapter 2: </a:t>
             </a:r>
           </a:p>
           <a:p>
@@ -3468,8 +3460,8 @@
         </p:nvSpPr>
         <p:spPr>
           <a:xfrm>
-            <a:off x="4389571" y="2831717"/>
-            <a:ext cx="3701783" cy="769441"/>
+            <a:off x="3645653" y="2579168"/>
+            <a:ext cx="5189627" cy="1446550"/>
           </a:xfrm>
           <a:prstGeom prst="rect">
             <a:avLst/>
@@ -3489,7 +3481,31 @@
                   <a:srgbClr val="C00000"/>
                 </a:solidFill>
               </a:rPr>
-              <a:t>Building Blocks</a:t>
+              <a:t>Elements </a:t>
+            </a:r>
+            <a:r>
+              <a:rPr lang="de-DE" sz="4400" b="1" dirty="0" err="1" smtClean="0">
+                <a:solidFill>
+                  <a:srgbClr val="C00000"/>
+                </a:solidFill>
+              </a:rPr>
+              <a:t>of</a:t>
+            </a:r>
+            <a:endParaRPr lang="de-DE" sz="4400" b="1" dirty="0" smtClean="0">
+              <a:solidFill>
+                <a:srgbClr val="C00000"/>
+              </a:solidFill>
+            </a:endParaRPr>
+          </a:p>
+          <a:p>
+            <a:pPr algn="ctr"/>
+            <a:r>
+              <a:rPr lang="de-DE" sz="4400" b="1" dirty="0" smtClean="0">
+                <a:solidFill>
+                  <a:srgbClr val="C00000"/>
+                </a:solidFill>
+              </a:rPr>
+              <a:t>Software Engineering</a:t>
             </a:r>
             <a:endParaRPr lang="de-DE" sz="4400" b="1" dirty="0">
               <a:solidFill>

</xml_diff>